<commit_message>
Converting PowerPoint to Video
</commit_message>
<xml_diff>
--- a/Main Files/Template Files/Powerpoint/Q&A.pptx
+++ b/Main Files/Template Files/Powerpoint/Q&A.pptx
@@ -9,7 +9,6 @@
     <p:sldId id="283" r:id="rId3"/>
     <p:sldId id="284" r:id="rId4"/>
     <p:sldId id="285" r:id="rId5"/>
-    <p:sldId id="286" r:id="rId6"/>
   </p:sldIdLst>
   <p:sldSz cx="12192000" cy="6858000"/>
   <p:notesSz cx="6858000" cy="9144000"/>
@@ -331,7 +330,7 @@
           <a:p>
             <a:fld id="{65B99F26-C849-4AE2-AE6A-B9FA0E2C85F3}" type="datetimeFigureOut">
               <a:rPr lang="en-US" smtClean="0"/>
-              <a:t>8/11/2024</a:t>
+              <a:t>11/27/2024</a:t>
             </a:fld>
             <a:endParaRPr lang="en-US"/>
           </a:p>
@@ -474,7 +473,7 @@
           <a:p>
             <a:fld id="{65B99F26-C849-4AE2-AE6A-B9FA0E2C85F3}" type="datetimeFigureOut">
               <a:rPr lang="en-US" smtClean="0"/>
-              <a:t>8/11/2024</a:t>
+              <a:t>11/27/2024</a:t>
             </a:fld>
             <a:endParaRPr lang="en-US"/>
           </a:p>
@@ -587,7 +586,7 @@
           <a:p>
             <a:fld id="{65B99F26-C849-4AE2-AE6A-B9FA0E2C85F3}" type="datetimeFigureOut">
               <a:rPr lang="en-US" smtClean="0"/>
-              <a:t>8/11/2024</a:t>
+              <a:t>11/27/2024</a:t>
             </a:fld>
             <a:endParaRPr lang="en-US"/>
           </a:p>
@@ -730,7 +729,7 @@
           <a:p>
             <a:fld id="{65B99F26-C849-4AE2-AE6A-B9FA0E2C85F3}" type="datetimeFigureOut">
               <a:rPr lang="en-US" smtClean="0"/>
-              <a:t>8/11/2024</a:t>
+              <a:t>11/27/2024</a:t>
             </a:fld>
             <a:endParaRPr lang="en-US"/>
           </a:p>
@@ -873,7 +872,7 @@
           <a:p>
             <a:fld id="{65B99F26-C849-4AE2-AE6A-B9FA0E2C85F3}" type="datetimeFigureOut">
               <a:rPr lang="en-US" smtClean="0"/>
-              <a:t>8/11/2024</a:t>
+              <a:t>11/27/2024</a:t>
             </a:fld>
             <a:endParaRPr lang="en-US"/>
           </a:p>
@@ -1284,7 +1283,7 @@
           <a:p>
             <a:fld id="{65B99F26-C849-4AE2-AE6A-B9FA0E2C85F3}" type="datetimeFigureOut">
               <a:rPr lang="en-US" smtClean="0"/>
-              <a:t>8/11/2024</a:t>
+              <a:t>11/27/2024</a:t>
             </a:fld>
             <a:endParaRPr lang="en-US"/>
           </a:p>
@@ -1572,7 +1571,7 @@
           <a:p>
             <a:fld id="{65B99F26-C849-4AE2-AE6A-B9FA0E2C85F3}" type="datetimeFigureOut">
               <a:rPr lang="en-US" smtClean="0"/>
-              <a:t>8/11/2024</a:t>
+              <a:t>11/27/2024</a:t>
             </a:fld>
             <a:endParaRPr lang="en-US"/>
           </a:p>
@@ -1770,7 +1769,7 @@
           <a:p>
             <a:fld id="{65B99F26-C849-4AE2-AE6A-B9FA0E2C85F3}" type="datetimeFigureOut">
               <a:rPr lang="en-US" smtClean="0"/>
-              <a:t>8/11/2024</a:t>
+              <a:t>11/27/2024</a:t>
             </a:fld>
             <a:endParaRPr lang="en-US"/>
           </a:p>
@@ -1978,7 +1977,7 @@
           <a:p>
             <a:fld id="{65B99F26-C849-4AE2-AE6A-B9FA0E2C85F3}" type="datetimeFigureOut">
               <a:rPr lang="en-US" smtClean="0"/>
-              <a:t>8/11/2024</a:t>
+              <a:t>11/27/2024</a:t>
             </a:fld>
             <a:endParaRPr lang="en-US"/>
           </a:p>
@@ -2176,7 +2175,7 @@
           <a:p>
             <a:fld id="{65B99F26-C849-4AE2-AE6A-B9FA0E2C85F3}" type="datetimeFigureOut">
               <a:rPr lang="en-US" smtClean="0"/>
-              <a:t>8/11/2024</a:t>
+              <a:t>11/27/2024</a:t>
             </a:fld>
             <a:endParaRPr lang="en-US"/>
           </a:p>
@@ -2451,7 +2450,7 @@
           <a:p>
             <a:fld id="{65B99F26-C849-4AE2-AE6A-B9FA0E2C85F3}" type="datetimeFigureOut">
               <a:rPr lang="en-US" smtClean="0"/>
-              <a:t>8/11/2024</a:t>
+              <a:t>11/27/2024</a:t>
             </a:fld>
             <a:endParaRPr lang="en-US"/>
           </a:p>
@@ -2716,7 +2715,7 @@
           <a:p>
             <a:fld id="{65B99F26-C849-4AE2-AE6A-B9FA0E2C85F3}" type="datetimeFigureOut">
               <a:rPr lang="en-US" smtClean="0"/>
-              <a:t>8/11/2024</a:t>
+              <a:t>11/27/2024</a:t>
             </a:fld>
             <a:endParaRPr lang="en-US"/>
           </a:p>
@@ -3128,7 +3127,7 @@
           <a:p>
             <a:fld id="{65B99F26-C849-4AE2-AE6A-B9FA0E2C85F3}" type="datetimeFigureOut">
               <a:rPr lang="en-US" smtClean="0"/>
-              <a:t>8/11/2024</a:t>
+              <a:t>11/27/2024</a:t>
             </a:fld>
             <a:endParaRPr lang="en-US"/>
           </a:p>
@@ -3269,7 +3268,7 @@
           <a:p>
             <a:fld id="{65B99F26-C849-4AE2-AE6A-B9FA0E2C85F3}" type="datetimeFigureOut">
               <a:rPr lang="en-US" smtClean="0"/>
-              <a:t>8/11/2024</a:t>
+              <a:t>11/27/2024</a:t>
             </a:fld>
             <a:endParaRPr lang="en-US"/>
           </a:p>
@@ -3382,7 +3381,7 @@
           <a:p>
             <a:fld id="{65B99F26-C849-4AE2-AE6A-B9FA0E2C85F3}" type="datetimeFigureOut">
               <a:rPr lang="en-US" smtClean="0"/>
-              <a:t>8/11/2024</a:t>
+              <a:t>11/27/2024</a:t>
             </a:fld>
             <a:endParaRPr lang="en-US"/>
           </a:p>
@@ -3525,7 +3524,7 @@
           <a:p>
             <a:fld id="{65B99F26-C849-4AE2-AE6A-B9FA0E2C85F3}" type="datetimeFigureOut">
               <a:rPr lang="en-US" smtClean="0"/>
-              <a:t>8/11/2024</a:t>
+              <a:t>11/27/2024</a:t>
             </a:fld>
             <a:endParaRPr lang="en-US"/>
           </a:p>
@@ -3668,7 +3667,7 @@
           <a:p>
             <a:fld id="{65B99F26-C849-4AE2-AE6A-B9FA0E2C85F3}" type="datetimeFigureOut">
               <a:rPr lang="en-US" smtClean="0"/>
-              <a:t>8/11/2024</a:t>
+              <a:t>11/27/2024</a:t>
             </a:fld>
             <a:endParaRPr lang="en-US"/>
           </a:p>
@@ -3909,7 +3908,7 @@
           <a:p>
             <a:fld id="{65B99F26-C849-4AE2-AE6A-B9FA0E2C85F3}" type="datetimeFigureOut">
               <a:rPr lang="en-US" smtClean="0"/>
-              <a:t>8/11/2024</a:t>
+              <a:t>11/27/2024</a:t>
             </a:fld>
             <a:endParaRPr lang="en-US"/>
           </a:p>
@@ -6046,7 +6045,43 @@
                 <a:ea typeface="Montserrat" panose="00000500000000000000" pitchFamily="2" charset="0"/>
                 <a:cs typeface="Montserrat" panose="00000500000000000000" pitchFamily="2" charset="0"/>
               </a:rPr>
-              <a:t>01</a:t>
+              <a:t>{{</a:t>
+            </a:r>
+            <a:r>
+              <a:rPr lang="en-US" sz="2800" b="1" spc="180" dirty="0" err="1">
+                <a:solidFill>
+                  <a:srgbClr val="FFD96A"/>
+                </a:solidFill>
+                <a:effectLst>
+                  <a:outerShdw blurRad="63500" sx="102000" sy="102000" algn="ctr" rotWithShape="0">
+                    <a:prstClr val="black">
+                      <a:alpha val="40000"/>
+                    </a:prstClr>
+                  </a:outerShdw>
+                </a:effectLst>
+                <a:latin typeface="Montserrat SemiBold" panose="00000700000000000000" pitchFamily="2" charset="0"/>
+                <a:ea typeface="Montserrat" panose="00000500000000000000" pitchFamily="2" charset="0"/>
+                <a:cs typeface="Montserrat" panose="00000500000000000000" pitchFamily="2" charset="0"/>
+              </a:rPr>
+              <a:t>QuestionNumber</a:t>
+            </a:r>
+            <a:r>
+              <a:rPr lang="en-US" sz="2800" b="1" spc="180" dirty="0">
+                <a:solidFill>
+                  <a:srgbClr val="FFD96A"/>
+                </a:solidFill>
+                <a:effectLst>
+                  <a:outerShdw blurRad="63500" sx="102000" sy="102000" algn="ctr" rotWithShape="0">
+                    <a:prstClr val="black">
+                      <a:alpha val="40000"/>
+                    </a:prstClr>
+                  </a:outerShdw>
+                </a:effectLst>
+                <a:latin typeface="Montserrat SemiBold" panose="00000700000000000000" pitchFamily="2" charset="0"/>
+                <a:ea typeface="Montserrat" panose="00000500000000000000" pitchFamily="2" charset="0"/>
+                <a:cs typeface="Montserrat" panose="00000500000000000000" pitchFamily="2" charset="0"/>
+              </a:rPr>
+              <a:t>}}</a:t>
             </a:r>
             <a:endParaRPr lang="en-US" sz="2400" dirty="0">
               <a:solidFill>
@@ -6212,7 +6247,7 @@
         <p:spPr>
           <a:xfrm>
             <a:off x="1417961" y="231146"/>
-            <a:ext cx="7823200" cy="397032"/>
+            <a:ext cx="7823200" cy="377924"/>
           </a:xfrm>
           <a:prstGeom prst="rect">
             <a:avLst/>
@@ -6237,7 +6272,7 @@
               </a:spcAft>
             </a:pPr>
             <a:r>
-              <a:rPr lang="ar-SA" sz="1800" dirty="0">
+              <a:rPr lang="en-US" sz="1800" dirty="0" err="1">
                 <a:solidFill>
                   <a:srgbClr val="FFD96A"/>
                 </a:solidFill>
@@ -6252,61 +6287,7 @@
                 <a:ea typeface="Montserrat" panose="00000500000000000000" pitchFamily="2" charset="0"/>
                 <a:cs typeface="Hacen Tehran" panose="02000000000000000000" pitchFamily="2" charset="-78"/>
               </a:rPr>
-              <a:t>إيجاد الجذور للدوال </a:t>
-            </a:r>
-            <a:r>
-              <a:rPr lang="ar-SA" sz="1800" dirty="0" err="1">
-                <a:solidFill>
-                  <a:srgbClr val="FFD96A"/>
-                </a:solidFill>
-                <a:effectLst>
-                  <a:outerShdw blurRad="63500" sx="102000" sy="102000" algn="ctr" rotWithShape="0">
-                    <a:prstClr val="black">
-                      <a:alpha val="40000"/>
-                    </a:prstClr>
-                  </a:outerShdw>
-                </a:effectLst>
-                <a:latin typeface="Montserrat" panose="00000500000000000000" pitchFamily="2" charset="0"/>
-                <a:ea typeface="Montserrat" panose="00000500000000000000" pitchFamily="2" charset="0"/>
-                <a:cs typeface="Hacen Tehran" panose="02000000000000000000" pitchFamily="2" charset="-78"/>
-              </a:rPr>
-              <a:t>الخربوطية</a:t>
-            </a:r>
-            <a:r>
-              <a:rPr lang="ar-SA" sz="1800" dirty="0">
-                <a:solidFill>
-                  <a:srgbClr val="FFD96A"/>
-                </a:solidFill>
-                <a:effectLst>
-                  <a:outerShdw blurRad="63500" sx="102000" sy="102000" algn="ctr" rotWithShape="0">
-                    <a:prstClr val="black">
-                      <a:alpha val="40000"/>
-                    </a:prstClr>
-                  </a:outerShdw>
-                </a:effectLst>
-                <a:latin typeface="Montserrat" panose="00000500000000000000" pitchFamily="2" charset="0"/>
-                <a:ea typeface="Montserrat" panose="00000500000000000000" pitchFamily="2" charset="0"/>
-                <a:cs typeface="Hacen Tehran" panose="02000000000000000000" pitchFamily="2" charset="-78"/>
-              </a:rPr>
-              <a:t> </a:t>
-            </a:r>
-            <a:r>
-              <a:rPr lang="ar-SA" sz="1800" dirty="0" err="1">
-                <a:solidFill>
-                  <a:srgbClr val="FFD96A"/>
-                </a:solidFill>
-                <a:effectLst>
-                  <a:outerShdw blurRad="63500" sx="102000" sy="102000" algn="ctr" rotWithShape="0">
-                    <a:prstClr val="black">
-                      <a:alpha val="40000"/>
-                    </a:prstClr>
-                  </a:outerShdw>
-                </a:effectLst>
-                <a:latin typeface="Montserrat" panose="00000500000000000000" pitchFamily="2" charset="0"/>
-                <a:ea typeface="Montserrat" panose="00000500000000000000" pitchFamily="2" charset="0"/>
-                <a:cs typeface="Hacen Tehran" panose="02000000000000000000" pitchFamily="2" charset="-78"/>
-              </a:rPr>
-              <a:t>المادريوشو</a:t>
+              <a:t>MainCategoryName</a:t>
             </a:r>
             <a:endParaRPr lang="en-US" sz="800" dirty="0">
               <a:solidFill>
@@ -6530,7 +6511,7 @@
           <a:p>
             <a:pPr algn="just" rtl="1"/>
             <a:r>
-              <a:rPr lang="ar-SA" sz="2400" dirty="0">
+              <a:rPr lang="en-US" sz="2400" dirty="0" err="1">
                 <a:solidFill>
                   <a:srgbClr val="1D424B"/>
                 </a:solidFill>
@@ -6538,7 +6519,7 @@
                 <a:ea typeface="Roboto Black" panose="02000000000000000000" pitchFamily="2" charset="0"/>
                 <a:cs typeface="Hacen Tehran" panose="02000000000000000000" pitchFamily="2" charset="-78"/>
               </a:rPr>
-              <a:t>نص السؤال نص السؤال نص السؤال نص السؤال نص السؤال نص السؤال نص السؤال نص السؤال نص السؤال نص السؤال نص السؤال نص السؤال نص السؤال نص السؤال نص السؤال نص السؤال نص السؤال نص السؤال نص السؤال نص السؤال نص السؤال نص السؤال نص السؤال نص السؤال نص السؤال نص السؤال نص السؤال نص السؤال نص السؤال نص السؤال نص السؤال نص السؤال نص السؤال نص السؤال</a:t>
+              <a:t>QuestionText</a:t>
             </a:r>
             <a:endParaRPr lang="en-US" sz="2400" dirty="0">
               <a:solidFill>
@@ -6619,13 +6600,13 @@
   <p:clrMapOvr>
     <a:masterClrMapping/>
   </p:clrMapOvr>
-  <mc:AlternateContent xmlns:mc="http://schemas.openxmlformats.org/markup-compatibility/2006">
-    <mc:Choice xmlns:p159="http://schemas.microsoft.com/office/powerpoint/2015/09/main" Requires="p159">
+  <mc:AlternateContent xmlns:mc="http://schemas.openxmlformats.org/markup-compatibility/2006" xmlns:p159="http://schemas.microsoft.com/office/powerpoint/2015/09/main">
+    <mc:Choice Requires="p159">
       <p:transition xmlns:p14="http://schemas.microsoft.com/office/powerpoint/2010/main" spd="slow" p14:dur="3000" advTm="2000">
         <p159:morph option="byObject"/>
       </p:transition>
     </mc:Choice>
-    <mc:Fallback>
+    <mc:Fallback xmlns="">
       <p:transition spd="slow" advTm="2000">
         <p:fade/>
       </p:transition>
@@ -8350,7 +8331,7 @@
               </a:spcAft>
             </a:pPr>
             <a:r>
-              <a:rPr lang="en-US" sz="2800" b="1" spc="180" dirty="0">
+              <a:rPr lang="en-US" sz="2800" b="1" spc="180" dirty="0" err="1">
                 <a:solidFill>
                   <a:srgbClr val="FFD96A"/>
                 </a:solidFill>
@@ -8365,8 +8346,36 @@
                 <a:ea typeface="Montserrat" panose="00000500000000000000" pitchFamily="2" charset="0"/>
                 <a:cs typeface="Montserrat" panose="00000500000000000000" pitchFamily="2" charset="0"/>
               </a:rPr>
-              <a:t>01</a:t>
-            </a:r>
+              <a:t>QuestionNumber</a:t>
+            </a:r>
+            <a:endParaRPr lang="en-US" sz="2800" b="1" spc="180" dirty="0">
+              <a:solidFill>
+                <a:srgbClr val="FFD96A"/>
+              </a:solidFill>
+              <a:effectLst>
+                <a:outerShdw blurRad="63500" sx="102000" sy="102000" algn="ctr" rotWithShape="0">
+                  <a:prstClr val="black">
+                    <a:alpha val="40000"/>
+                  </a:prstClr>
+                </a:outerShdw>
+              </a:effectLst>
+              <a:latin typeface="Montserrat SemiBold" panose="00000700000000000000" pitchFamily="2" charset="0"/>
+              <a:ea typeface="Montserrat" panose="00000500000000000000" pitchFamily="2" charset="0"/>
+              <a:cs typeface="Montserrat" panose="00000500000000000000" pitchFamily="2" charset="0"/>
+            </a:endParaRPr>
+          </a:p>
+          <a:p>
+            <a:pPr marL="86995" marR="87630" algn="ctr">
+              <a:lnSpc>
+                <a:spcPct val="110000"/>
+              </a:lnSpc>
+              <a:spcBef>
+                <a:spcPts val="0"/>
+              </a:spcBef>
+              <a:spcAft>
+                <a:spcPts val="0"/>
+              </a:spcAft>
+            </a:pPr>
             <a:endParaRPr lang="en-US" sz="2400" dirty="0">
               <a:solidFill>
                 <a:srgbClr val="FFD96A"/>
@@ -8996,13 +9005,13 @@
   <p:clrMapOvr>
     <a:masterClrMapping/>
   </p:clrMapOvr>
-  <mc:AlternateContent xmlns:mc="http://schemas.openxmlformats.org/markup-compatibility/2006">
-    <mc:Choice xmlns:p159="http://schemas.microsoft.com/office/powerpoint/2015/09/main" Requires="p159">
+  <mc:AlternateContent xmlns:mc="http://schemas.openxmlformats.org/markup-compatibility/2006" xmlns:p159="http://schemas.microsoft.com/office/powerpoint/2015/09/main">
+    <mc:Choice Requires="p159">
       <p:transition xmlns:p14="http://schemas.microsoft.com/office/powerpoint/2010/main" spd="slow" p14:dur="3000" advTm="2000">
         <p159:morph option="byObject"/>
       </p:transition>
     </mc:Choice>
-    <mc:Fallback>
+    <mc:Fallback xmlns="">
       <p:transition spd="slow" advTm="2000">
         <p:fade/>
       </p:transition>
@@ -11682,13 +11691,13 @@
   <p:clrMapOvr>
     <a:masterClrMapping/>
   </p:clrMapOvr>
-  <mc:AlternateContent xmlns:mc="http://schemas.openxmlformats.org/markup-compatibility/2006">
-    <mc:Choice xmlns:p159="http://schemas.microsoft.com/office/powerpoint/2015/09/main" Requires="p159">
+  <mc:AlternateContent xmlns:mc="http://schemas.openxmlformats.org/markup-compatibility/2006" xmlns:p159="http://schemas.microsoft.com/office/powerpoint/2015/09/main">
+    <mc:Choice Requires="p159">
       <p:transition xmlns:p14="http://schemas.microsoft.com/office/powerpoint/2010/main" spd="slow" p14:dur="3000" advTm="2000">
         <p159:morph option="byObject"/>
       </p:transition>
     </mc:Choice>
-    <mc:Fallback>
+    <mc:Fallback xmlns="">
       <p:transition spd="slow" advTm="2000">
         <p:fade/>
       </p:transition>
@@ -13912,7 +13921,7 @@
           <a:p>
             <a:pPr algn="just" rtl="1"/>
             <a:r>
-              <a:rPr lang="ar-SA" sz="2400" dirty="0">
+              <a:rPr lang="en-US" sz="2400" dirty="0">
                 <a:solidFill>
                   <a:srgbClr val="1D424B"/>
                 </a:solidFill>
@@ -13920,50 +13929,16 @@
                 <a:ea typeface="Roboto Black" panose="02000000000000000000" pitchFamily="2" charset="0"/>
                 <a:cs typeface="Hacen Tehran" panose="02000000000000000000" pitchFamily="2" charset="-78"/>
               </a:rPr>
-              <a:t>الخطوة 1: </a:t>
-            </a:r>
-          </a:p>
-          <a:p>
-            <a:pPr algn="just" rtl="1"/>
-            <a:r>
-              <a:rPr lang="ar-SA" sz="2400" dirty="0">
-                <a:solidFill>
-                  <a:srgbClr val="1D424B"/>
-                </a:solidFill>
-                <a:latin typeface="Hacen Tehran" panose="02000000000000000000" pitchFamily="2" charset="-78"/>
-                <a:ea typeface="Roboto Black" panose="02000000000000000000" pitchFamily="2" charset="0"/>
-                <a:cs typeface="Hacen Tehran" panose="02000000000000000000" pitchFamily="2" charset="-78"/>
-              </a:rPr>
-              <a:t>الخطوة 2:</a:t>
-            </a:r>
-          </a:p>
-          <a:p>
-            <a:pPr algn="just" rtl="1"/>
-            <a:r>
-              <a:rPr lang="ar-SA" sz="2400" dirty="0">
-                <a:solidFill>
-                  <a:srgbClr val="1D424B"/>
-                </a:solidFill>
-                <a:latin typeface="Hacen Tehran" panose="02000000000000000000" pitchFamily="2" charset="-78"/>
-                <a:ea typeface="Roboto Black" panose="02000000000000000000" pitchFamily="2" charset="0"/>
-                <a:cs typeface="Hacen Tehran" panose="02000000000000000000" pitchFamily="2" charset="-78"/>
-              </a:rPr>
-              <a:t>الخطوة 3:</a:t>
-            </a:r>
-          </a:p>
-          <a:p>
-            <a:pPr algn="just" rtl="1"/>
-            <a:r>
-              <a:rPr lang="ar-SA" sz="2400" dirty="0">
-                <a:solidFill>
-                  <a:srgbClr val="1D424B"/>
-                </a:solidFill>
-                <a:latin typeface="Hacen Tehran" panose="02000000000000000000" pitchFamily="2" charset="-78"/>
-                <a:ea typeface="Roboto Black" panose="02000000000000000000" pitchFamily="2" charset="0"/>
-                <a:cs typeface="Hacen Tehran" panose="02000000000000000000" pitchFamily="2" charset="-78"/>
-              </a:rPr>
-              <a:t>الخطوة 4: </a:t>
-            </a:r>
+              <a:t>{{Explanation}}</a:t>
+            </a:r>
+            <a:endParaRPr lang="ar-SA" sz="2400" dirty="0">
+              <a:solidFill>
+                <a:srgbClr val="1D424B"/>
+              </a:solidFill>
+              <a:latin typeface="Hacen Tehran" panose="02000000000000000000" pitchFamily="2" charset="-78"/>
+              <a:ea typeface="Roboto Black" panose="02000000000000000000" pitchFamily="2" charset="0"/>
+              <a:cs typeface="Hacen Tehran" panose="02000000000000000000" pitchFamily="2" charset="-78"/>
+            </a:endParaRPr>
           </a:p>
         </p:txBody>
       </p:sp>
@@ -14151,63 +14126,13 @@
   <p:clrMapOvr>
     <a:masterClrMapping/>
   </p:clrMapOvr>
-  <mc:AlternateContent xmlns:mc="http://schemas.openxmlformats.org/markup-compatibility/2006">
-    <mc:Choice xmlns:p159="http://schemas.microsoft.com/office/powerpoint/2015/09/main" Requires="p159">
+  <mc:AlternateContent xmlns:mc="http://schemas.openxmlformats.org/markup-compatibility/2006" xmlns:p159="http://schemas.microsoft.com/office/powerpoint/2015/09/main">
+    <mc:Choice Requires="p159">
       <p:transition xmlns:p14="http://schemas.microsoft.com/office/powerpoint/2010/main" spd="slow" p14:dur="3000" advTm="2000">
         <p159:morph option="byObject"/>
       </p:transition>
     </mc:Choice>
-    <mc:Fallback>
-      <p:transition spd="slow" advTm="2000">
-        <p:fade/>
-      </p:transition>
-    </mc:Fallback>
-  </mc:AlternateContent>
-</p:sld>
-</file>
-
-<file path=ppt/slides/slide5.xml><?xml version="1.0" encoding="utf-8"?>
-<p:sld xmlns:a="http://schemas.openxmlformats.org/drawingml/2006/main" xmlns:r="http://schemas.openxmlformats.org/officeDocument/2006/relationships" xmlns:p="http://schemas.openxmlformats.org/presentationml/2006/main">
-  <p:cSld>
-    <p:bg>
-      <p:bgPr>
-        <a:solidFill>
-          <a:schemeClr val="tx1"/>
-        </a:solidFill>
-        <a:effectLst/>
-      </p:bgPr>
-    </p:bg>
-    <p:spTree>
-      <p:nvGrpSpPr>
-        <p:cNvPr id="1" name=""/>
-        <p:cNvGrpSpPr/>
-        <p:nvPr/>
-      </p:nvGrpSpPr>
-      <p:grpSpPr>
-        <a:xfrm>
-          <a:off x="0" y="0"/>
-          <a:ext cx="0" cy="0"/>
-          <a:chOff x="0" y="0"/>
-          <a:chExt cx="0" cy="0"/>
-        </a:xfrm>
-      </p:grpSpPr>
-    </p:spTree>
-    <p:extLst>
-      <p:ext uri="{BB962C8B-B14F-4D97-AF65-F5344CB8AC3E}">
-        <p14:creationId xmlns:p14="http://schemas.microsoft.com/office/powerpoint/2010/main" val="3407412957"/>
-      </p:ext>
-    </p:extLst>
-  </p:cSld>
-  <p:clrMapOvr>
-    <a:masterClrMapping/>
-  </p:clrMapOvr>
-  <mc:AlternateContent xmlns:mc="http://schemas.openxmlformats.org/markup-compatibility/2006">
-    <mc:Choice xmlns:p159="http://schemas.microsoft.com/office/powerpoint/2015/09/main" Requires="p159">
-      <p:transition xmlns:p14="http://schemas.microsoft.com/office/powerpoint/2010/main" spd="slow" p14:dur="3000" advTm="2000">
-        <p159:morph option="byObject"/>
-      </p:transition>
-    </mc:Choice>
-    <mc:Fallback>
+    <mc:Fallback xmlns="">
       <p:transition spd="slow" advTm="2000">
         <p:fade/>
       </p:transition>

</xml_diff>